<commit_message>
ADDED: lecture 1 pdf
</commit_message>
<xml_diff>
--- a/lectures/Лекция 01, Введение, классификация сетей_нв_2.pptx
+++ b/lectures/Лекция 01, Введение, классификация сетей_нв_2.pptx
@@ -5,51 +5,51 @@
     <p:sldMasterId id="2147483648" r:id="rId1"/>
   </p:sldMasterIdLst>
   <p:sldIdLst>
-    <p:sldId id="256" r:id="rId3"/>
-    <p:sldId id="257" r:id="rId4"/>
-    <p:sldId id="353" r:id="rId5"/>
-    <p:sldId id="271" r:id="rId6"/>
-    <p:sldId id="258" r:id="rId7"/>
-    <p:sldId id="279" r:id="rId8"/>
-    <p:sldId id="291" r:id="rId9"/>
-    <p:sldId id="261" r:id="rId10"/>
-    <p:sldId id="273" r:id="rId11"/>
-    <p:sldId id="280" r:id="rId12"/>
-    <p:sldId id="354" r:id="rId13"/>
-    <p:sldId id="355" r:id="rId14"/>
-    <p:sldId id="356" r:id="rId15"/>
-    <p:sldId id="357" r:id="rId16"/>
-    <p:sldId id="358" r:id="rId17"/>
-    <p:sldId id="359" r:id="rId18"/>
-    <p:sldId id="360" r:id="rId19"/>
-    <p:sldId id="361" r:id="rId20"/>
-    <p:sldId id="362" r:id="rId21"/>
-    <p:sldId id="278" r:id="rId22"/>
-    <p:sldId id="272" r:id="rId23"/>
-    <p:sldId id="274" r:id="rId24"/>
-    <p:sldId id="276" r:id="rId25"/>
-    <p:sldId id="275" r:id="rId26"/>
-    <p:sldId id="281" r:id="rId27"/>
-    <p:sldId id="277" r:id="rId28"/>
-    <p:sldId id="315" r:id="rId29"/>
-    <p:sldId id="305" r:id="rId30"/>
-    <p:sldId id="306" r:id="rId31"/>
-    <p:sldId id="312" r:id="rId32"/>
-    <p:sldId id="283" r:id="rId33"/>
-    <p:sldId id="304" r:id="rId34"/>
-    <p:sldId id="282" r:id="rId35"/>
-    <p:sldId id="295" r:id="rId36"/>
-    <p:sldId id="284" r:id="rId37"/>
-    <p:sldId id="297" r:id="rId38"/>
-    <p:sldId id="285" r:id="rId39"/>
-    <p:sldId id="314" r:id="rId40"/>
-    <p:sldId id="296" r:id="rId41"/>
-    <p:sldId id="313" r:id="rId42"/>
-    <p:sldId id="286" r:id="rId43"/>
-    <p:sldId id="311" r:id="rId44"/>
-    <p:sldId id="287" r:id="rId45"/>
-    <p:sldId id="288" r:id="rId46"/>
-    <p:sldId id="292" r:id="rId47"/>
+    <p:sldId id="256" r:id="rId2"/>
+    <p:sldId id="257" r:id="rId3"/>
+    <p:sldId id="353" r:id="rId4"/>
+    <p:sldId id="271" r:id="rId5"/>
+    <p:sldId id="258" r:id="rId6"/>
+    <p:sldId id="279" r:id="rId7"/>
+    <p:sldId id="291" r:id="rId8"/>
+    <p:sldId id="261" r:id="rId9"/>
+    <p:sldId id="273" r:id="rId10"/>
+    <p:sldId id="280" r:id="rId11"/>
+    <p:sldId id="354" r:id="rId12"/>
+    <p:sldId id="355" r:id="rId13"/>
+    <p:sldId id="356" r:id="rId14"/>
+    <p:sldId id="357" r:id="rId15"/>
+    <p:sldId id="358" r:id="rId16"/>
+    <p:sldId id="359" r:id="rId17"/>
+    <p:sldId id="360" r:id="rId18"/>
+    <p:sldId id="361" r:id="rId19"/>
+    <p:sldId id="362" r:id="rId20"/>
+    <p:sldId id="278" r:id="rId21"/>
+    <p:sldId id="272" r:id="rId22"/>
+    <p:sldId id="274" r:id="rId23"/>
+    <p:sldId id="276" r:id="rId24"/>
+    <p:sldId id="275" r:id="rId25"/>
+    <p:sldId id="281" r:id="rId26"/>
+    <p:sldId id="277" r:id="rId27"/>
+    <p:sldId id="315" r:id="rId28"/>
+    <p:sldId id="305" r:id="rId29"/>
+    <p:sldId id="306" r:id="rId30"/>
+    <p:sldId id="312" r:id="rId31"/>
+    <p:sldId id="283" r:id="rId32"/>
+    <p:sldId id="304" r:id="rId33"/>
+    <p:sldId id="282" r:id="rId34"/>
+    <p:sldId id="295" r:id="rId35"/>
+    <p:sldId id="284" r:id="rId36"/>
+    <p:sldId id="297" r:id="rId37"/>
+    <p:sldId id="285" r:id="rId38"/>
+    <p:sldId id="314" r:id="rId39"/>
+    <p:sldId id="296" r:id="rId40"/>
+    <p:sldId id="313" r:id="rId41"/>
+    <p:sldId id="286" r:id="rId42"/>
+    <p:sldId id="311" r:id="rId43"/>
+    <p:sldId id="287" r:id="rId44"/>
+    <p:sldId id="288" r:id="rId45"/>
+    <p:sldId id="292" r:id="rId46"/>
   </p:sldIdLst>
   <p:sldSz cx="9144000" cy="6858000" type="screen4x3"/>
   <p:notesSz cx="6858000" cy="9144000"/>
@@ -148,11 +148,27 @@
       </a:defRPr>
     </a:lvl9pPr>
   </p:defaultTextStyle>
+  <p:extLst>
+    <p:ext uri="{EFAFB233-063F-42B5-8137-9DF3F51BA10A}">
+      <p15:sldGuideLst xmlns:p15="http://schemas.microsoft.com/office/powerpoint/2012/main">
+        <p15:guide id="1" orient="horz" pos="2160">
+          <p15:clr>
+            <a:srgbClr val="A4A3A4"/>
+          </p15:clr>
+        </p15:guide>
+        <p15:guide id="2" pos="2880">
+          <p15:clr>
+            <a:srgbClr val="A4A3A4"/>
+          </p15:clr>
+        </p15:guide>
+      </p15:sldGuideLst>
+    </p:ext>
+  </p:extLst>
 </p:presentation>
 </file>
 
 <file path=ppt/slideLayouts/slideLayout1.xml><?xml version="1.0" encoding="utf-8"?>
-<p:sldLayout xmlns:a="http://schemas.openxmlformats.org/drawingml/2006/main" xmlns:r="http://schemas.openxmlformats.org/officeDocument/2006/relationships" xmlns:p="http://schemas.openxmlformats.org/presentationml/2006/main" type="title" preserve="1" showMasterSp="0">
+<p:sldLayout xmlns:a="http://schemas.openxmlformats.org/drawingml/2006/main" xmlns:r="http://schemas.openxmlformats.org/officeDocument/2006/relationships" xmlns:p="http://schemas.openxmlformats.org/presentationml/2006/main" showMasterSp="0" type="title" preserve="1">
   <p:cSld name="Титульный слайд">
     <p:spTree>
       <p:nvGrpSpPr>
@@ -294,6 +310,7 @@
           <a:p>
             <a:fld id="{31852A7E-DB94-4D1C-A2A7-64A55011B845}" type="datetimeFigureOut">
               <a:rPr lang="ru-RU" smtClean="0"/>
+              <a:t>27.10.2021</a:t>
             </a:fld>
             <a:endParaRPr lang="ru-RU"/>
           </a:p>
@@ -345,6 +362,7 @@
           <a:p>
             <a:fld id="{500C1DD5-B3AC-441C-BDF4-18DEB7449D6B}" type="slidenum">
               <a:rPr lang="ru-RU" smtClean="0"/>
+              <a:t>‹#›</a:t>
             </a:fld>
             <a:endParaRPr lang="ru-RU"/>
           </a:p>
@@ -602,7 +620,6 @@
               <a:rPr lang="ru-RU" smtClean="0"/>
               <a:t>Образец текста</a:t>
             </a:r>
-            <a:endParaRPr lang="ru-RU" smtClean="0"/>
           </a:p>
           <a:p>
             <a:pPr lvl="1" eaLnBrk="1" latinLnBrk="0" hangingPunct="1"/>
@@ -610,7 +627,6 @@
               <a:rPr lang="ru-RU" smtClean="0"/>
               <a:t>Второй уровень</a:t>
             </a:r>
-            <a:endParaRPr lang="ru-RU" smtClean="0"/>
           </a:p>
           <a:p>
             <a:pPr lvl="2" eaLnBrk="1" latinLnBrk="0" hangingPunct="1"/>
@@ -618,7 +634,6 @@
               <a:rPr lang="ru-RU" smtClean="0"/>
               <a:t>Третий уровень</a:t>
             </a:r>
-            <a:endParaRPr lang="ru-RU" smtClean="0"/>
           </a:p>
           <a:p>
             <a:pPr lvl="3" eaLnBrk="1" latinLnBrk="0" hangingPunct="1"/>
@@ -626,7 +641,6 @@
               <a:rPr lang="ru-RU" smtClean="0"/>
               <a:t>Четвертый уровень</a:t>
             </a:r>
-            <a:endParaRPr lang="ru-RU" smtClean="0"/>
           </a:p>
           <a:p>
             <a:pPr lvl="4" eaLnBrk="1" latinLnBrk="0" hangingPunct="1"/>
@@ -655,6 +669,7 @@
           <a:p>
             <a:fld id="{31852A7E-DB94-4D1C-A2A7-64A55011B845}" type="datetimeFigureOut">
               <a:rPr lang="ru-RU" smtClean="0"/>
+              <a:t>27.10.2021</a:t>
             </a:fld>
             <a:endParaRPr lang="ru-RU"/>
           </a:p>
@@ -696,6 +711,7 @@
           <a:p>
             <a:fld id="{500C1DD5-B3AC-441C-BDF4-18DEB7449D6B}" type="slidenum">
               <a:rPr lang="ru-RU" smtClean="0"/>
+              <a:t>‹#›</a:t>
             </a:fld>
             <a:endParaRPr lang="ru-RU"/>
           </a:p>
@@ -710,7 +726,7 @@
 </file>
 
 <file path=ppt/slideLayouts/slideLayout11.xml><?xml version="1.0" encoding="utf-8"?>
-<p:sldLayout xmlns:a="http://schemas.openxmlformats.org/drawingml/2006/main" xmlns:r="http://schemas.openxmlformats.org/officeDocument/2006/relationships" xmlns:p="http://schemas.openxmlformats.org/presentationml/2006/main" type="vertTitleAndTx" preserve="1" showMasterSp="0">
+<p:sldLayout xmlns:a="http://schemas.openxmlformats.org/drawingml/2006/main" xmlns:r="http://schemas.openxmlformats.org/officeDocument/2006/relationships" xmlns:p="http://schemas.openxmlformats.org/presentationml/2006/main" showMasterSp="0" type="vertTitleAndTx" preserve="1">
   <p:cSld name="Вертикальный заголовок и текст">
     <p:spTree>
       <p:nvGrpSpPr>
@@ -779,7 +795,6 @@
               <a:rPr lang="ru-RU" smtClean="0"/>
               <a:t>Образец текста</a:t>
             </a:r>
-            <a:endParaRPr lang="ru-RU" smtClean="0"/>
           </a:p>
           <a:p>
             <a:pPr lvl="1" eaLnBrk="1" latinLnBrk="0" hangingPunct="1"/>
@@ -787,7 +802,6 @@
               <a:rPr lang="ru-RU" smtClean="0"/>
               <a:t>Второй уровень</a:t>
             </a:r>
-            <a:endParaRPr lang="ru-RU" smtClean="0"/>
           </a:p>
           <a:p>
             <a:pPr lvl="2" eaLnBrk="1" latinLnBrk="0" hangingPunct="1"/>
@@ -795,7 +809,6 @@
               <a:rPr lang="ru-RU" smtClean="0"/>
               <a:t>Третий уровень</a:t>
             </a:r>
-            <a:endParaRPr lang="ru-RU" smtClean="0"/>
           </a:p>
           <a:p>
             <a:pPr lvl="3" eaLnBrk="1" latinLnBrk="0" hangingPunct="1"/>
@@ -803,7 +816,6 @@
               <a:rPr lang="ru-RU" smtClean="0"/>
               <a:t>Четвертый уровень</a:t>
             </a:r>
-            <a:endParaRPr lang="ru-RU" smtClean="0"/>
           </a:p>
           <a:p>
             <a:pPr lvl="4" eaLnBrk="1" latinLnBrk="0" hangingPunct="1"/>
@@ -832,6 +844,7 @@
           <a:p>
             <a:fld id="{31852A7E-DB94-4D1C-A2A7-64A55011B845}" type="datetimeFigureOut">
               <a:rPr lang="ru-RU" smtClean="0"/>
+              <a:t>27.10.2021</a:t>
             </a:fld>
             <a:endParaRPr lang="ru-RU"/>
           </a:p>
@@ -873,6 +886,7 @@
           <a:p>
             <a:fld id="{500C1DD5-B3AC-441C-BDF4-18DEB7449D6B}" type="slidenum">
               <a:rPr lang="ru-RU" smtClean="0"/>
+              <a:t>‹#›</a:t>
             </a:fld>
             <a:endParaRPr lang="ru-RU"/>
           </a:p>
@@ -1065,6 +1079,7 @@
           <a:p>
             <a:fld id="{31852A7E-DB94-4D1C-A2A7-64A55011B845}" type="datetimeFigureOut">
               <a:rPr lang="ru-RU" smtClean="0"/>
+              <a:t>27.10.2021</a:t>
             </a:fld>
             <a:endParaRPr lang="ru-RU"/>
           </a:p>
@@ -1106,6 +1121,7 @@
           <a:p>
             <a:fld id="{500C1DD5-B3AC-441C-BDF4-18DEB7449D6B}" type="slidenum">
               <a:rPr lang="ru-RU" smtClean="0"/>
+              <a:t>‹#›</a:t>
             </a:fld>
             <a:endParaRPr lang="ru-RU"/>
           </a:p>
@@ -1136,7 +1152,6 @@
               <a:rPr lang="ru-RU" smtClean="0"/>
               <a:t>Образец текста</a:t>
             </a:r>
-            <a:endParaRPr lang="ru-RU" smtClean="0"/>
           </a:p>
           <a:p>
             <a:pPr lvl="1" eaLnBrk="1" latinLnBrk="0" hangingPunct="1"/>
@@ -1144,7 +1159,6 @@
               <a:rPr lang="ru-RU" smtClean="0"/>
               <a:t>Второй уровень</a:t>
             </a:r>
-            <a:endParaRPr lang="ru-RU" smtClean="0"/>
           </a:p>
           <a:p>
             <a:pPr lvl="2" eaLnBrk="1" latinLnBrk="0" hangingPunct="1"/>
@@ -1152,7 +1166,6 @@
               <a:rPr lang="ru-RU" smtClean="0"/>
               <a:t>Третий уровень</a:t>
             </a:r>
-            <a:endParaRPr lang="ru-RU" smtClean="0"/>
           </a:p>
           <a:p>
             <a:pPr lvl="3" eaLnBrk="1" latinLnBrk="0" hangingPunct="1"/>
@@ -1160,7 +1173,6 @@
               <a:rPr lang="ru-RU" smtClean="0"/>
               <a:t>Четвертый уровень</a:t>
             </a:r>
-            <a:endParaRPr lang="ru-RU" smtClean="0"/>
           </a:p>
           <a:p>
             <a:pPr lvl="4" eaLnBrk="1" latinLnBrk="0" hangingPunct="1"/>
@@ -1181,7 +1193,7 @@
 </file>
 
 <file path=ppt/slideLayouts/slideLayout3.xml><?xml version="1.0" encoding="utf-8"?>
-<p:sldLayout xmlns:a="http://schemas.openxmlformats.org/drawingml/2006/main" xmlns:r="http://schemas.openxmlformats.org/officeDocument/2006/relationships" xmlns:p="http://schemas.openxmlformats.org/presentationml/2006/main" type="secHead" preserve="1" showMasterSp="0">
+<p:sldLayout xmlns:a="http://schemas.openxmlformats.org/drawingml/2006/main" xmlns:r="http://schemas.openxmlformats.org/officeDocument/2006/relationships" xmlns:p="http://schemas.openxmlformats.org/presentationml/2006/main" showMasterSp="0" type="secHead" preserve="1">
   <p:cSld name="Заголовок раздела">
     <p:bg>
       <p:bgRef idx="1001">
@@ -1311,7 +1323,6 @@
               <a:rPr kumimoji="0" lang="ru-RU" smtClean="0"/>
               <a:t>Образец текста</a:t>
             </a:r>
-            <a:endParaRPr kumimoji="0" lang="ru-RU" smtClean="0"/>
           </a:p>
         </p:txBody>
       </p:sp>
@@ -1337,6 +1348,7 @@
           <a:p>
             <a:fld id="{31852A7E-DB94-4D1C-A2A7-64A55011B845}" type="datetimeFigureOut">
               <a:rPr lang="ru-RU" smtClean="0"/>
+              <a:t>27.10.2021</a:t>
             </a:fld>
             <a:endParaRPr lang="ru-RU"/>
           </a:p>
@@ -1388,6 +1400,7 @@
           <a:p>
             <a:fld id="{500C1DD5-B3AC-441C-BDF4-18DEB7449D6B}" type="slidenum">
               <a:rPr lang="ru-RU" smtClean="0"/>
+              <a:t>‹#›</a:t>
             </a:fld>
             <a:endParaRPr lang="ru-RU"/>
           </a:p>
@@ -1555,6 +1568,7 @@
           <a:p>
             <a:fld id="{31852A7E-DB94-4D1C-A2A7-64A55011B845}" type="datetimeFigureOut">
               <a:rPr lang="ru-RU" smtClean="0"/>
+              <a:t>27.10.2021</a:t>
             </a:fld>
             <a:endParaRPr lang="ru-RU"/>
           </a:p>
@@ -1596,6 +1610,7 @@
           <a:p>
             <a:fld id="{500C1DD5-B3AC-441C-BDF4-18DEB7449D6B}" type="slidenum">
               <a:rPr lang="ru-RU" smtClean="0"/>
+              <a:t>‹#›</a:t>
             </a:fld>
             <a:endParaRPr lang="ru-RU"/>
           </a:p>
@@ -1626,7 +1641,6 @@
               <a:rPr lang="ru-RU" smtClean="0"/>
               <a:t>Образец текста</a:t>
             </a:r>
-            <a:endParaRPr lang="ru-RU" smtClean="0"/>
           </a:p>
           <a:p>
             <a:pPr lvl="1" eaLnBrk="1" latinLnBrk="0" hangingPunct="1"/>
@@ -1634,7 +1648,6 @@
               <a:rPr lang="ru-RU" smtClean="0"/>
               <a:t>Второй уровень</a:t>
             </a:r>
-            <a:endParaRPr lang="ru-RU" smtClean="0"/>
           </a:p>
           <a:p>
             <a:pPr lvl="2" eaLnBrk="1" latinLnBrk="0" hangingPunct="1"/>
@@ -1642,7 +1655,6 @@
               <a:rPr lang="ru-RU" smtClean="0"/>
               <a:t>Третий уровень</a:t>
             </a:r>
-            <a:endParaRPr lang="ru-RU" smtClean="0"/>
           </a:p>
           <a:p>
             <a:pPr lvl="3" eaLnBrk="1" latinLnBrk="0" hangingPunct="1"/>
@@ -1650,7 +1662,6 @@
               <a:rPr lang="ru-RU" smtClean="0"/>
               <a:t>Четвертый уровень</a:t>
             </a:r>
-            <a:endParaRPr lang="ru-RU" smtClean="0"/>
           </a:p>
           <a:p>
             <a:pPr lvl="4" eaLnBrk="1" latinLnBrk="0" hangingPunct="1"/>
@@ -1687,7 +1698,6 @@
               <a:rPr lang="ru-RU" smtClean="0"/>
               <a:t>Образец текста</a:t>
             </a:r>
-            <a:endParaRPr lang="ru-RU" smtClean="0"/>
           </a:p>
           <a:p>
             <a:pPr lvl="1" eaLnBrk="1" latinLnBrk="0" hangingPunct="1"/>
@@ -1695,7 +1705,6 @@
               <a:rPr lang="ru-RU" smtClean="0"/>
               <a:t>Второй уровень</a:t>
             </a:r>
-            <a:endParaRPr lang="ru-RU" smtClean="0"/>
           </a:p>
           <a:p>
             <a:pPr lvl="2" eaLnBrk="1" latinLnBrk="0" hangingPunct="1"/>
@@ -1703,7 +1712,6 @@
               <a:rPr lang="ru-RU" smtClean="0"/>
               <a:t>Третий уровень</a:t>
             </a:r>
-            <a:endParaRPr lang="ru-RU" smtClean="0"/>
           </a:p>
           <a:p>
             <a:pPr lvl="3" eaLnBrk="1" latinLnBrk="0" hangingPunct="1"/>
@@ -1711,7 +1719,6 @@
               <a:rPr lang="ru-RU" smtClean="0"/>
               <a:t>Четвертый уровень</a:t>
             </a:r>
-            <a:endParaRPr lang="ru-RU" smtClean="0"/>
           </a:p>
           <a:p>
             <a:pPr lvl="4" eaLnBrk="1" latinLnBrk="0" hangingPunct="1"/>
@@ -1836,7 +1843,6 @@
               <a:rPr kumimoji="0" lang="ru-RU" smtClean="0"/>
               <a:t>Образец текста</a:t>
             </a:r>
-            <a:endParaRPr kumimoji="0" lang="ru-RU" smtClean="0"/>
           </a:p>
         </p:txBody>
       </p:sp>
@@ -1894,7 +1900,6 @@
               <a:rPr kumimoji="0" lang="ru-RU" smtClean="0"/>
               <a:t>Образец текста</a:t>
             </a:r>
-            <a:endParaRPr kumimoji="0" lang="ru-RU" smtClean="0"/>
           </a:p>
         </p:txBody>
       </p:sp>
@@ -1915,6 +1920,7 @@
           <a:p>
             <a:fld id="{31852A7E-DB94-4D1C-A2A7-64A55011B845}" type="datetimeFigureOut">
               <a:rPr lang="ru-RU" smtClean="0"/>
+              <a:t>27.10.2021</a:t>
             </a:fld>
             <a:endParaRPr lang="ru-RU"/>
           </a:p>
@@ -1956,6 +1962,7 @@
           <a:p>
             <a:fld id="{500C1DD5-B3AC-441C-BDF4-18DEB7449D6B}" type="slidenum">
               <a:rPr lang="ru-RU" smtClean="0"/>
+              <a:t>‹#›</a:t>
             </a:fld>
             <a:endParaRPr lang="ru-RU"/>
           </a:p>
@@ -1986,7 +1993,6 @@
               <a:rPr lang="ru-RU" smtClean="0"/>
               <a:t>Образец текста</a:t>
             </a:r>
-            <a:endParaRPr lang="ru-RU" smtClean="0"/>
           </a:p>
           <a:p>
             <a:pPr lvl="1" eaLnBrk="1" latinLnBrk="0" hangingPunct="1"/>
@@ -1994,7 +2000,6 @@
               <a:rPr lang="ru-RU" smtClean="0"/>
               <a:t>Второй уровень</a:t>
             </a:r>
-            <a:endParaRPr lang="ru-RU" smtClean="0"/>
           </a:p>
           <a:p>
             <a:pPr lvl="2" eaLnBrk="1" latinLnBrk="0" hangingPunct="1"/>
@@ -2002,7 +2007,6 @@
               <a:rPr lang="ru-RU" smtClean="0"/>
               <a:t>Третий уровень</a:t>
             </a:r>
-            <a:endParaRPr lang="ru-RU" smtClean="0"/>
           </a:p>
           <a:p>
             <a:pPr lvl="3" eaLnBrk="1" latinLnBrk="0" hangingPunct="1"/>
@@ -2010,7 +2014,6 @@
               <a:rPr lang="ru-RU" smtClean="0"/>
               <a:t>Четвертый уровень</a:t>
             </a:r>
-            <a:endParaRPr lang="ru-RU" smtClean="0"/>
           </a:p>
           <a:p>
             <a:pPr lvl="4" eaLnBrk="1" latinLnBrk="0" hangingPunct="1"/>
@@ -2047,7 +2050,6 @@
               <a:rPr lang="ru-RU" smtClean="0"/>
               <a:t>Образец текста</a:t>
             </a:r>
-            <a:endParaRPr lang="ru-RU" smtClean="0"/>
           </a:p>
           <a:p>
             <a:pPr lvl="1" eaLnBrk="1" latinLnBrk="0" hangingPunct="1"/>
@@ -2055,7 +2057,6 @@
               <a:rPr lang="ru-RU" smtClean="0"/>
               <a:t>Второй уровень</a:t>
             </a:r>
-            <a:endParaRPr lang="ru-RU" smtClean="0"/>
           </a:p>
           <a:p>
             <a:pPr lvl="2" eaLnBrk="1" latinLnBrk="0" hangingPunct="1"/>
@@ -2063,7 +2064,6 @@
               <a:rPr lang="ru-RU" smtClean="0"/>
               <a:t>Третий уровень</a:t>
             </a:r>
-            <a:endParaRPr lang="ru-RU" smtClean="0"/>
           </a:p>
           <a:p>
             <a:pPr lvl="3" eaLnBrk="1" latinLnBrk="0" hangingPunct="1"/>
@@ -2071,7 +2071,6 @@
               <a:rPr lang="ru-RU" smtClean="0"/>
               <a:t>Четвертый уровень</a:t>
             </a:r>
-            <a:endParaRPr lang="ru-RU" smtClean="0"/>
           </a:p>
           <a:p>
             <a:pPr lvl="4" eaLnBrk="1" latinLnBrk="0" hangingPunct="1"/>
@@ -2153,6 +2152,7 @@
           <a:p>
             <a:fld id="{31852A7E-DB94-4D1C-A2A7-64A55011B845}" type="datetimeFigureOut">
               <a:rPr lang="ru-RU" smtClean="0"/>
+              <a:t>27.10.2021</a:t>
             </a:fld>
             <a:endParaRPr lang="ru-RU"/>
           </a:p>
@@ -2194,6 +2194,7 @@
           <a:p>
             <a:fld id="{500C1DD5-B3AC-441C-BDF4-18DEB7449D6B}" type="slidenum">
               <a:rPr lang="ru-RU" smtClean="0"/>
+              <a:t>‹#›</a:t>
             </a:fld>
             <a:endParaRPr lang="ru-RU"/>
           </a:p>
@@ -2258,7 +2259,7 @@
 </file>
 
 <file path=ppt/slideLayouts/slideLayout7.xml><?xml version="1.0" encoding="utf-8"?>
-<p:sldLayout xmlns:a="http://schemas.openxmlformats.org/drawingml/2006/main" xmlns:r="http://schemas.openxmlformats.org/officeDocument/2006/relationships" xmlns:p="http://schemas.openxmlformats.org/presentationml/2006/main" type="blank" preserve="1" showMasterSp="0">
+<p:sldLayout xmlns:a="http://schemas.openxmlformats.org/drawingml/2006/main" xmlns:r="http://schemas.openxmlformats.org/officeDocument/2006/relationships" xmlns:p="http://schemas.openxmlformats.org/presentationml/2006/main" showMasterSp="0" type="blank" preserve="1">
   <p:cSld name="Пустой слайд">
     <p:spTree>
       <p:nvGrpSpPr>
@@ -2291,6 +2292,7 @@
           <a:p>
             <a:fld id="{31852A7E-DB94-4D1C-A2A7-64A55011B845}" type="datetimeFigureOut">
               <a:rPr lang="ru-RU" smtClean="0"/>
+              <a:t>27.10.2021</a:t>
             </a:fld>
             <a:endParaRPr lang="ru-RU"/>
           </a:p>
@@ -2332,6 +2334,7 @@
           <a:p>
             <a:fld id="{500C1DD5-B3AC-441C-BDF4-18DEB7449D6B}" type="slidenum">
               <a:rPr lang="ru-RU" smtClean="0"/>
+              <a:t>‹#›</a:t>
             </a:fld>
             <a:endParaRPr lang="ru-RU"/>
           </a:p>
@@ -2432,7 +2435,7 @@
 </file>
 
 <file path=ppt/slideLayouts/slideLayout8.xml><?xml version="1.0" encoding="utf-8"?>
-<p:sldLayout xmlns:a="http://schemas.openxmlformats.org/drawingml/2006/main" xmlns:r="http://schemas.openxmlformats.org/officeDocument/2006/relationships" xmlns:p="http://schemas.openxmlformats.org/presentationml/2006/main" type="objTx" preserve="1" showMasterSp="0">
+<p:sldLayout xmlns:a="http://schemas.openxmlformats.org/drawingml/2006/main" xmlns:r="http://schemas.openxmlformats.org/officeDocument/2006/relationships" xmlns:p="http://schemas.openxmlformats.org/presentationml/2006/main" showMasterSp="0" type="objTx" preserve="1">
   <p:cSld name="Объект с подписью">
     <p:spTree>
       <p:nvGrpSpPr>
@@ -2546,7 +2549,6 @@
               <a:rPr kumimoji="0" lang="ru-RU" smtClean="0"/>
               <a:t>Образец текста</a:t>
             </a:r>
-            <a:endParaRPr kumimoji="0" lang="ru-RU" smtClean="0"/>
           </a:p>
         </p:txBody>
       </p:sp>
@@ -2567,6 +2569,7 @@
           <a:p>
             <a:fld id="{31852A7E-DB94-4D1C-A2A7-64A55011B845}" type="datetimeFigureOut">
               <a:rPr lang="ru-RU" smtClean="0"/>
+              <a:t>27.10.2021</a:t>
             </a:fld>
             <a:endParaRPr lang="ru-RU"/>
           </a:p>
@@ -2608,6 +2611,7 @@
           <a:p>
             <a:fld id="{500C1DD5-B3AC-441C-BDF4-18DEB7449D6B}" type="slidenum">
               <a:rPr lang="ru-RU" smtClean="0"/>
+              <a:t>‹#›</a:t>
             </a:fld>
             <a:endParaRPr lang="ru-RU"/>
           </a:p>
@@ -2760,7 +2764,6 @@
               <a:rPr lang="ru-RU" smtClean="0"/>
               <a:t>Образец текста</a:t>
             </a:r>
-            <a:endParaRPr lang="ru-RU" smtClean="0"/>
           </a:p>
           <a:p>
             <a:pPr lvl="1" eaLnBrk="1" latinLnBrk="0" hangingPunct="1"/>
@@ -2768,7 +2771,6 @@
               <a:rPr lang="ru-RU" smtClean="0"/>
               <a:t>Второй уровень</a:t>
             </a:r>
-            <a:endParaRPr lang="ru-RU" smtClean="0"/>
           </a:p>
           <a:p>
             <a:pPr lvl="2" eaLnBrk="1" latinLnBrk="0" hangingPunct="1"/>
@@ -2776,7 +2778,6 @@
               <a:rPr lang="ru-RU" smtClean="0"/>
               <a:t>Третий уровень</a:t>
             </a:r>
-            <a:endParaRPr lang="ru-RU" smtClean="0"/>
           </a:p>
           <a:p>
             <a:pPr lvl="3" eaLnBrk="1" latinLnBrk="0" hangingPunct="1"/>
@@ -2784,7 +2785,6 @@
               <a:rPr lang="ru-RU" smtClean="0"/>
               <a:t>Четвертый уровень</a:t>
             </a:r>
-            <a:endParaRPr lang="ru-RU" smtClean="0"/>
           </a:p>
           <a:p>
             <a:pPr lvl="4" eaLnBrk="1" latinLnBrk="0" hangingPunct="1"/>
@@ -2805,7 +2805,7 @@
 </file>
 
 <file path=ppt/slideLayouts/slideLayout9.xml><?xml version="1.0" encoding="utf-8"?>
-<p:sldLayout xmlns:a="http://schemas.openxmlformats.org/drawingml/2006/main" xmlns:r="http://schemas.openxmlformats.org/officeDocument/2006/relationships" xmlns:p="http://schemas.openxmlformats.org/presentationml/2006/main" type="picTx" preserve="1" showMasterSp="0">
+<p:sldLayout xmlns:a="http://schemas.openxmlformats.org/drawingml/2006/main" xmlns:r="http://schemas.openxmlformats.org/officeDocument/2006/relationships" xmlns:p="http://schemas.openxmlformats.org/presentationml/2006/main" showMasterSp="0" type="picTx" preserve="1">
   <p:cSld name="Рисунок с подписью">
     <p:bg>
       <p:bgRef idx="1001">
@@ -2956,7 +2956,6 @@
               <a:rPr kumimoji="0" lang="ru-RU" smtClean="0"/>
               <a:t>Образец текста</a:t>
             </a:r>
-            <a:endParaRPr kumimoji="0" lang="ru-RU" smtClean="0"/>
           </a:p>
         </p:txBody>
       </p:sp>
@@ -2977,6 +2976,7 @@
           <a:p>
             <a:fld id="{31852A7E-DB94-4D1C-A2A7-64A55011B845}" type="datetimeFigureOut">
               <a:rPr lang="ru-RU" smtClean="0"/>
+              <a:t>27.10.2021</a:t>
             </a:fld>
             <a:endParaRPr lang="ru-RU"/>
           </a:p>
@@ -3018,6 +3018,7 @@
           <a:p>
             <a:fld id="{500C1DD5-B3AC-441C-BDF4-18DEB7449D6B}" type="slidenum">
               <a:rPr lang="ru-RU" smtClean="0"/>
+              <a:t>‹#›</a:t>
             </a:fld>
             <a:endParaRPr lang="ru-RU"/>
           </a:p>
@@ -3248,7 +3249,6 @@
               <a:rPr kumimoji="0" lang="ru-RU" smtClean="0"/>
               <a:t>Образец текста</a:t>
             </a:r>
-            <a:endParaRPr kumimoji="0" lang="ru-RU" smtClean="0"/>
           </a:p>
           <a:p>
             <a:pPr lvl="1" eaLnBrk="1" latinLnBrk="0" hangingPunct="1"/>
@@ -3256,7 +3256,6 @@
               <a:rPr kumimoji="0" lang="ru-RU" smtClean="0"/>
               <a:t>Второй уровень</a:t>
             </a:r>
-            <a:endParaRPr kumimoji="0" lang="ru-RU" smtClean="0"/>
           </a:p>
           <a:p>
             <a:pPr lvl="2" eaLnBrk="1" latinLnBrk="0" hangingPunct="1"/>
@@ -3264,7 +3263,6 @@
               <a:rPr kumimoji="0" lang="ru-RU" smtClean="0"/>
               <a:t>Третий уровень</a:t>
             </a:r>
-            <a:endParaRPr kumimoji="0" lang="ru-RU" smtClean="0"/>
           </a:p>
           <a:p>
             <a:pPr lvl="3" eaLnBrk="1" latinLnBrk="0" hangingPunct="1"/>
@@ -3272,7 +3270,6 @@
               <a:rPr kumimoji="0" lang="ru-RU" smtClean="0"/>
               <a:t>Четвертый уровень</a:t>
             </a:r>
-            <a:endParaRPr kumimoji="0" lang="ru-RU" smtClean="0"/>
           </a:p>
           <a:p>
             <a:pPr lvl="4" eaLnBrk="1" latinLnBrk="0" hangingPunct="1"/>
@@ -3317,6 +3314,7 @@
           <a:p>
             <a:fld id="{31852A7E-DB94-4D1C-A2A7-64A55011B845}" type="datetimeFigureOut">
               <a:rPr lang="ru-RU" smtClean="0"/>
+              <a:t>27.10.2021</a:t>
             </a:fld>
             <a:endParaRPr lang="ru-RU"/>
           </a:p>
@@ -3390,6 +3388,7 @@
           <a:p>
             <a:fld id="{500C1DD5-B3AC-441C-BDF4-18DEB7449D6B}" type="slidenum">
               <a:rPr lang="ru-RU" smtClean="0"/>
+              <a:t>‹#›</a:t>
             </a:fld>
             <a:endParaRPr lang="ru-RU"/>
           </a:p>
@@ -4021,7 +4020,7 @@
           <p:nvPr/>
         </p:nvPicPr>
         <p:blipFill>
-          <a:blip r:embed="rId1">
+          <a:blip r:embed="rId2">
             <a:extLst>
               <a:ext uri="{28A0092B-C50C-407E-A947-70E740481C1C}">
                 <a14:useLocalDpi xmlns:a14="http://schemas.microsoft.com/office/drawing/2010/main" val="0"/>
@@ -4090,7 +4089,14 @@
         <p:cNvGrpSpPr/>
         <p:nvPr/>
       </p:nvGrpSpPr>
-      <p:grpSpPr/>
+      <p:grpSpPr>
+        <a:xfrm>
+          <a:off x="0" y="0"/>
+          <a:ext cx="0" cy="0"/>
+          <a:chOff x="0" y="0"/>
+          <a:chExt cx="0" cy="0"/>
+        </a:xfrm>
+      </p:grpSpPr>
       <p:sp>
         <p:nvSpPr>
           <p:cNvPr id="2" name="Заголовок 1"/>
@@ -4104,12 +4110,12 @@
         <p:spPr/>
         <p:txBody>
           <a:bodyPr/>
+          <a:lstStyle/>
           <a:p>
             <a:r>
               <a:rPr lang="ru-RU" altLang="en-US"/>
               <a:t>Многотерминальные системы</a:t>
             </a:r>
-            <a:endParaRPr lang="ru-RU" altLang="en-US"/>
           </a:p>
         </p:txBody>
       </p:sp>
@@ -4128,26 +4134,24 @@
           <a:bodyPr>
             <a:normAutofit fontScale="80000"/>
           </a:bodyPr>
+          <a:lstStyle/>
           <a:p>
             <a:r>
               <a:rPr lang="ru-RU" altLang="en-US"/>
               <a:t>Компьютерные сети, называемые также сетями передачи данных, являются логическим результатом эволюции двух важнейших научно-технических отраслей современной цивилизации — компьютерных и телекоммуникационных технологий.</a:t>
             </a:r>
-            <a:endParaRPr lang="ru-RU" altLang="en-US"/>
           </a:p>
           <a:p>
             <a:r>
               <a:rPr lang="ru-RU" altLang="en-US"/>
               <a:t>В истоках компьютерного корня сетей - системы пакетной обработки данных. строились на базе мэйнфрейма — мощного и надежного компьютера универсального назначения. </a:t>
             </a:r>
-            <a:endParaRPr lang="ru-RU" altLang="en-US"/>
           </a:p>
           <a:p>
             <a:r>
               <a:rPr lang="ru-RU" altLang="en-US"/>
               <a:t>Пользователи подготавливали перфокарты, содержащие данные и команды программ, и передавали их в ВЦ. Операторы вводили эти карты в компьютер, а распечатанные результаты пользователи получали обычно только на следующий день. Неверно набитая карта означала как минимум суточную задержку. </a:t>
             </a:r>
-            <a:endParaRPr lang="ru-RU" altLang="en-US"/>
           </a:p>
           <a:p>
             <a:endParaRPr lang="ru-RU" altLang="en-US"/>
@@ -4298,7 +4302,6 @@
               <a:rPr lang="ru-RU" dirty="0"/>
               <a:t>) — компьютерная сеть, созданная в 1969 году в США Агентством Министерства обороны США по перспективным исследованиям (DARPA) и явившаяся прототипом сети Интернет. </a:t>
             </a:r>
-            <a:endParaRPr lang="ru-RU" dirty="0"/>
           </a:p>
           <a:p>
             <a:endParaRPr lang="ru-RU" dirty="0"/>
@@ -4314,7 +4317,7 @@
           <p:nvPr/>
         </p:nvPicPr>
         <p:blipFill>
-          <a:blip r:embed="rId1">
+          <a:blip r:embed="rId2">
             <a:extLst>
               <a:ext uri="{28A0092B-C50C-407E-A947-70E740481C1C}">
                 <a14:useLocalDpi xmlns:a14="http://schemas.microsoft.com/office/drawing/2010/main" val="0"/>
@@ -4459,7 +4462,6 @@
               <a:rPr lang="ru-RU" dirty="0" smtClean="0"/>
               <a:t>. В статье предсказывается появление глобальной взаимосвязанной сети компьютеров.</a:t>
             </a:r>
-            <a:endParaRPr lang="ru-RU" dirty="0" smtClean="0"/>
           </a:p>
           <a:p>
             <a:r>
@@ -4616,7 +4618,6 @@
               <a:rPr lang="ru-RU" dirty="0"/>
               <a:t>результате этого была создана первая (пусть и небольшая) широкомасштабная компьютерная сеть.</a:t>
             </a:r>
-            <a:endParaRPr lang="ru-RU" dirty="0"/>
           </a:p>
         </p:txBody>
       </p:sp>
@@ -4709,7 +4710,6 @@
               <a:rPr lang="ru-RU" dirty="0" smtClean="0"/>
               <a:t>).</a:t>
             </a:r>
-            <a:endParaRPr lang="ru-RU" dirty="0" smtClean="0"/>
           </a:p>
           <a:p>
             <a:r>
@@ -4764,7 +4764,6 @@
               <a:rPr lang="ru-RU" dirty="0" smtClean="0"/>
               <a:t>.</a:t>
             </a:r>
-            <a:endParaRPr lang="ru-RU" dirty="0" smtClean="0"/>
           </a:p>
           <a:p>
             <a:r>
@@ -4811,7 +4810,6 @@
               <a:rPr lang="ru-RU" dirty="0"/>
               <a:t>, завершила работу над созданием первоначального протокола связи между узлами сети ARPANET. Он назывался протоколом управления сетью (NCP).</a:t>
             </a:r>
-            <a:endParaRPr lang="ru-RU" dirty="0"/>
           </a:p>
         </p:txBody>
       </p:sp>
@@ -4972,7 +4970,6 @@
               <a:rPr lang="ru-RU" dirty="0"/>
               <a:t>. Первые RFC распространялись в печатном виде на бумаге в виде обычных писем, но уже с декабря 1969 г., когда заработали первые сегменты ARPANET, документы начали распространяться в электронном виде.</a:t>
             </a:r>
-            <a:endParaRPr lang="ru-RU" dirty="0"/>
           </a:p>
         </p:txBody>
       </p:sp>
@@ -5141,7 +5138,6 @@
               <a:rPr lang="en-US" dirty="0" smtClean="0"/>
               <a:t> ARPANET.</a:t>
             </a:r>
-            <a:endParaRPr lang="en-US" dirty="0" smtClean="0"/>
           </a:p>
           <a:p>
             <a:r>
@@ -5180,7 +5176,6 @@
               <a:rPr lang="en-US" dirty="0" smtClean="0"/>
               <a:t>.</a:t>
             </a:r>
-            <a:endParaRPr lang="en-US" dirty="0" smtClean="0"/>
           </a:p>
           <a:p>
             <a:r>
@@ -5377,7 +5372,6 @@
               <a:rPr lang="ru-RU" dirty="0" smtClean="0"/>
               <a:t>).</a:t>
             </a:r>
-            <a:endParaRPr lang="ru-RU" dirty="0" smtClean="0"/>
           </a:p>
           <a:p>
             <a:r>
@@ -5392,7 +5386,6 @@
               <a:rPr lang="ru-RU" dirty="0"/>
               <a:t>.</a:t>
             </a:r>
-            <a:endParaRPr lang="ru-RU" dirty="0"/>
           </a:p>
         </p:txBody>
       </p:sp>
@@ -5562,7 +5555,7 @@
           <p:nvPr/>
         </p:nvPicPr>
         <p:blipFill>
-          <a:blip r:embed="rId1">
+          <a:blip r:embed="rId2">
             <a:extLst>
               <a:ext uri="{28A0092B-C50C-407E-A947-70E740481C1C}">
                 <a14:useLocalDpi xmlns:a14="http://schemas.microsoft.com/office/drawing/2010/main" val="0"/>
@@ -5603,7 +5596,7 @@
           <p:nvPr/>
         </p:nvPicPr>
         <p:blipFill>
-          <a:blip r:embed="rId2" cstate="print">
+          <a:blip r:embed="rId3" cstate="print">
             <a:extLst>
               <a:ext uri="{28A0092B-C50C-407E-A947-70E740481C1C}">
                 <a14:useLocalDpi xmlns:a14="http://schemas.microsoft.com/office/drawing/2010/main" val="0"/>
@@ -5707,7 +5700,7 @@
           <p:nvPr/>
         </p:nvPicPr>
         <p:blipFill>
-          <a:blip r:embed="rId1">
+          <a:blip r:embed="rId2">
             <a:extLst>
               <a:ext uri="{28A0092B-C50C-407E-A947-70E740481C1C}">
                 <a14:useLocalDpi xmlns:a14="http://schemas.microsoft.com/office/drawing/2010/main" val="0"/>
@@ -5748,7 +5741,7 @@
           <p:nvPr/>
         </p:nvPicPr>
         <p:blipFill>
-          <a:blip r:embed="rId2">
+          <a:blip r:embed="rId3">
             <a:extLst>
               <a:ext uri="{28A0092B-C50C-407E-A947-70E740481C1C}">
                 <a14:useLocalDpi xmlns:a14="http://schemas.microsoft.com/office/drawing/2010/main" val="0"/>
@@ -5872,13 +5865,8 @@
             </a:r>
             <a:r>
               <a:rPr lang="ru-RU" dirty="0" smtClean="0"/>
-              <a:t>и т.д</a:t>
-            </a:r>
-            <a:r>
-              <a:rPr lang="ru-RU" dirty="0" smtClean="0"/>
-              <a:t>.)</a:t>
-            </a:r>
-            <a:endParaRPr lang="ru-RU" dirty="0" smtClean="0"/>
+              <a:t>и т.д.)</a:t>
+            </a:r>
           </a:p>
           <a:p>
             <a:pPr>
@@ -5898,7 +5886,6 @@
               <a:rPr lang="ru-RU" dirty="0" smtClean="0"/>
               <a:t>обусловленными средой передачи (проводная и беспроводная)</a:t>
             </a:r>
-            <a:endParaRPr lang="ru-RU" dirty="0" smtClean="0"/>
           </a:p>
           <a:p>
             <a:pPr>
@@ -5908,11 +5895,7 @@
             </a:pPr>
             <a:r>
               <a:rPr lang="ru-RU" dirty="0" smtClean="0"/>
-              <a:t>По </a:t>
-            </a:r>
-            <a:r>
-              <a:rPr lang="ru-RU" dirty="0" smtClean="0"/>
-              <a:t>топологии (</a:t>
+              <a:t>По топологии (</a:t>
             </a:r>
             <a:r>
               <a:rPr lang="ru-RU" dirty="0" err="1" smtClean="0"/>
@@ -5932,13 +5915,8 @@
             </a:r>
             <a:r>
               <a:rPr lang="ru-RU" dirty="0" smtClean="0"/>
-              <a:t>звезда и т.д</a:t>
-            </a:r>
-            <a:r>
-              <a:rPr lang="ru-RU" dirty="0" smtClean="0"/>
-              <a:t>.)</a:t>
-            </a:r>
-            <a:endParaRPr lang="ru-RU" dirty="0" smtClean="0"/>
+              <a:t>звезда и т.д.)</a:t>
+            </a:r>
           </a:p>
           <a:p>
             <a:pPr>
@@ -5950,7 +5928,6 @@
               <a:rPr lang="ru-RU" dirty="0" smtClean="0"/>
               <a:t>По признаку первичности</a:t>
             </a:r>
-            <a:endParaRPr lang="ru-RU" dirty="0" smtClean="0"/>
           </a:p>
           <a:p>
             <a:pPr>
@@ -5962,7 +5939,6 @@
               <a:rPr lang="ru-RU" dirty="0"/>
               <a:t>По способу коммутации</a:t>
             </a:r>
-            <a:endParaRPr lang="ru-RU" dirty="0"/>
           </a:p>
           <a:p>
             <a:pPr>
@@ -6056,21 +6032,18 @@
               <a:rPr lang="ru-RU" dirty="0" smtClean="0"/>
               <a:t>Небольшой радиус (до 30 м) </a:t>
             </a:r>
-            <a:endParaRPr lang="ru-RU" dirty="0" smtClean="0"/>
           </a:p>
           <a:p>
             <a:r>
               <a:rPr lang="ru-RU" dirty="0" smtClean="0"/>
               <a:t>Малое число участников (до 8)</a:t>
             </a:r>
-            <a:endParaRPr lang="ru-RU" dirty="0" smtClean="0"/>
           </a:p>
           <a:p>
             <a:r>
               <a:rPr lang="ru-RU" dirty="0" smtClean="0"/>
               <a:t>Не критичность в отказоустойчивости</a:t>
             </a:r>
-            <a:endParaRPr lang="ru-RU" dirty="0" smtClean="0"/>
           </a:p>
           <a:p>
             <a:r>
@@ -6097,7 +6070,6 @@
               <a:rPr lang="ru-RU" dirty="0" smtClean="0"/>
               <a:t>обстановке из-за частой смены окружения</a:t>
             </a:r>
-            <a:endParaRPr lang="ru-RU" dirty="0" smtClean="0"/>
           </a:p>
           <a:p>
             <a:r>
@@ -6124,7 +6096,6 @@
               <a:rPr lang="ru-RU" dirty="0" smtClean="0"/>
               <a:t>и др.</a:t>
             </a:r>
-            <a:endParaRPr lang="ru-RU" dirty="0" smtClean="0"/>
           </a:p>
           <a:p>
             <a:r>
@@ -6143,7 +6114,6 @@
               <a:rPr lang="ru-RU" dirty="0"/>
               <a:t>соединение компьютера с периферийными устройствами, такими как принтер, наушники, мышь, клавиатура и т. п. Мобильные телефоны также используют технологию PAN для соединения со своей периферией (чаще всего это наушники)</a:t>
             </a:r>
-            <a:endParaRPr lang="ru-RU" dirty="0"/>
           </a:p>
         </p:txBody>
       </p:sp>
@@ -6229,14 +6199,12 @@
               <a:rPr lang="ru-RU" dirty="0" smtClean="0"/>
               <a:t>так и крупные корпоративные</a:t>
             </a:r>
-            <a:endParaRPr lang="ru-RU" dirty="0" smtClean="0"/>
           </a:p>
           <a:p>
             <a:r>
               <a:rPr lang="ru-RU" dirty="0" smtClean="0"/>
               <a:t>Покрывают обычно небольшую территорию</a:t>
             </a:r>
-            <a:endParaRPr lang="ru-RU" dirty="0" smtClean="0"/>
           </a:p>
           <a:p>
             <a:endParaRPr lang="ru-RU" dirty="0"/>
@@ -6252,7 +6220,7 @@
           <p:nvPr/>
         </p:nvPicPr>
         <p:blipFill>
-          <a:blip r:embed="rId1">
+          <a:blip r:embed="rId2">
             <a:extLst>
               <a:ext uri="{28A0092B-C50C-407E-A947-70E740481C1C}">
                 <a14:useLocalDpi xmlns:a14="http://schemas.microsoft.com/office/drawing/2010/main" val="0"/>
@@ -6395,7 +6363,7 @@
           <p:nvPr/>
         </p:nvPicPr>
         <p:blipFill>
-          <a:blip r:embed="rId1">
+          <a:blip r:embed="rId2">
             <a:extLst>
               <a:ext uri="{28A0092B-C50C-407E-A947-70E740481C1C}">
                 <a14:useLocalDpi xmlns:a14="http://schemas.microsoft.com/office/drawing/2010/main" val="0"/>
@@ -6558,7 +6526,6 @@
               <a:rPr lang="ru-RU" dirty="0" smtClean="0"/>
               <a:t>охватывающая большие расстояния</a:t>
             </a:r>
-            <a:endParaRPr lang="ru-RU" dirty="0" smtClean="0"/>
           </a:p>
           <a:p>
             <a:r>
@@ -6573,7 +6540,6 @@
               <a:rPr lang="ru-RU" dirty="0" smtClean="0"/>
               <a:t>.</a:t>
             </a:r>
-            <a:endParaRPr lang="ru-RU" dirty="0" smtClean="0"/>
           </a:p>
           <a:p>
             <a:r>
@@ -6608,14 +6574,12 @@
               <a:rPr lang="ru-RU" dirty="0" smtClean="0"/>
               <a:t>охватывая миллионы хостов </a:t>
             </a:r>
-            <a:endParaRPr lang="ru-RU" dirty="0" smtClean="0"/>
           </a:p>
           <a:p>
             <a:r>
               <a:rPr lang="ru-RU" dirty="0" smtClean="0"/>
               <a:t>Основное отличие от локальных сетей – на физическом и канальном уровнях</a:t>
             </a:r>
-            <a:endParaRPr lang="ru-RU" dirty="0" smtClean="0"/>
           </a:p>
           <a:p>
             <a:r>
@@ -6723,7 +6687,6 @@
               <a:rPr lang="ru-RU" dirty="0" smtClean="0"/>
               <a:t>соединяет между собой только 2 компьютера</a:t>
             </a:r>
-            <a:endParaRPr lang="ru-RU" dirty="0" smtClean="0"/>
           </a:p>
           <a:p>
             <a:r>
@@ -6891,7 +6854,6 @@
               <a:rPr lang="ru-RU" dirty="0"/>
               <a:t>) — это локальная вычислительная сеть (LAN), в которой сетевые устройства централизованы и управляются одним или несколькими серверами. Индивидуальные рабочие станции или клиенты (такие, как ПК) должны обращаться к ресурсам сети через сервер(ы).</a:t>
             </a:r>
-            <a:endParaRPr lang="ru-RU" dirty="0"/>
           </a:p>
         </p:txBody>
       </p:sp>
@@ -6998,14 +6960,12 @@
               <a:rPr lang="ru-RU" dirty="0"/>
               <a:t>среда для создания физических каналов связи.</a:t>
             </a:r>
-            <a:endParaRPr lang="ru-RU" dirty="0"/>
           </a:p>
           <a:p>
             <a:r>
               <a:rPr lang="ru-RU" dirty="0"/>
               <a:t>Наложенные сети в этой классификации — это все остальные сети, которые предоставляют услуги конечным пользователям и строятся на основе каналов первичных сетей — «накладываются» поверх этих сетей. То есть и компьютерные, и телефонные, и телевизионные сети являются наложенными.</a:t>
             </a:r>
-            <a:endParaRPr lang="ru-RU" dirty="0"/>
           </a:p>
           <a:p>
             <a:endParaRPr lang="ru-RU" dirty="0"/>
@@ -7105,7 +7065,6 @@
               <a:rPr lang="ru-RU" dirty="0"/>
               <a:t> — электрические и информационные связи между ними.</a:t>
             </a:r>
-            <a:endParaRPr lang="ru-RU" dirty="0"/>
           </a:p>
           <a:p>
             <a:r>
@@ -7128,7 +7087,6 @@
               <a:rPr lang="ru-RU" dirty="0"/>
               <a:t> различных конфигураций (при условии неразличимости компьютеров).</a:t>
             </a:r>
-            <a:endParaRPr lang="ru-RU" dirty="0"/>
           </a:p>
           <a:p>
             <a:endParaRPr lang="ru-RU" dirty="0"/>
@@ -7179,7 +7137,6 @@
               <a:rPr lang="ru-RU" dirty="0"/>
               <a:t>Топология сети</a:t>
             </a:r>
-            <a:endParaRPr lang="ru-RU" dirty="0"/>
           </a:p>
         </p:txBody>
       </p:sp>
@@ -7213,7 +7170,6 @@
               <a:rPr lang="ru-RU" dirty="0"/>
               <a:t>присоединения новых узлов, свойственная некоторым топологиям, делает сеть легко расширяемой. Экономические соображения часто приводят к выбору топологий, для которых характерна минимальная суммарная длина линий связи.</a:t>
             </a:r>
-            <a:endParaRPr lang="ru-RU" dirty="0"/>
           </a:p>
         </p:txBody>
       </p:sp>
@@ -7234,7 +7190,14 @@
         <p:cNvGrpSpPr/>
         <p:nvPr/>
       </p:nvGrpSpPr>
-      <p:grpSpPr/>
+      <p:grpSpPr>
+        <a:xfrm>
+          <a:off x="0" y="0"/>
+          <a:ext cx="0" cy="0"/>
+          <a:chOff x="0" y="0"/>
+          <a:chExt cx="0" cy="0"/>
+        </a:xfrm>
+      </p:grpSpPr>
       <p:sp>
         <p:nvSpPr>
           <p:cNvPr id="2" name="Заголовок 1"/>
@@ -7248,12 +7211,12 @@
         <p:spPr/>
         <p:txBody>
           <a:bodyPr/>
+          <a:lstStyle/>
           <a:p>
             <a:r>
               <a:rPr lang="ru-RU" altLang="ru-RU"/>
               <a:t>Рекомендуемая литература</a:t>
             </a:r>
-            <a:endParaRPr lang="ru-RU" altLang="ru-RU"/>
           </a:p>
         </p:txBody>
       </p:sp>
@@ -7272,6 +7235,7 @@
           <a:bodyPr>
             <a:normAutofit fontScale="90000" lnSpcReduction="10000"/>
           </a:bodyPr>
+          <a:lstStyle/>
           <a:p>
             <a:r>
               <a:rPr lang="ru-RU" altLang="en-US" b="1"/>
@@ -7281,7 +7245,6 @@
               <a:rPr lang="ru-RU" altLang="en-US"/>
               <a:t> : пер. с англ. / Столлингс В. - 2-е изд. - СПб. : Питер, 2003. - 782 с. - (Классика computer science). - Библиогр.: с. 754-766. - ISBN 5-94723-327-4.</a:t>
             </a:r>
-            <a:endParaRPr lang="ru-RU" altLang="en-US"/>
           </a:p>
           <a:p>
             <a:r>
@@ -7292,7 +7255,6 @@
               <a:rPr lang="ru-RU" altLang="en-US"/>
               <a:t> : пер. с англ. / Стивенс У. Р. ; пер. Колос А., Михайлова А. - СПб. : Питер, 2003. - 1085 с. - (Мастер-класс). - Библиогр.: с. 1027-1033. - ISBN 5-318-00535-7.</a:t>
             </a:r>
-            <a:endParaRPr lang="ru-RU" altLang="en-US"/>
           </a:p>
           <a:p>
             <a:r>
@@ -7303,7 +7265,6 @@
               <a:rPr lang="ru-RU" altLang="en-US"/>
               <a:t> : пер. с англ. / Уолтон Ш. - М. : Вильямс, 2001. - 463 с. : ил. - ISBN 5-8459-0193-6.</a:t>
             </a:r>
-            <a:endParaRPr lang="ru-RU" altLang="en-US"/>
           </a:p>
           <a:p>
             <a:r>
@@ -7403,7 +7364,6 @@
               <a:rPr lang="ru-RU" dirty="0"/>
               <a:t>Топология сети</a:t>
             </a:r>
-            <a:endParaRPr lang="ru-RU" dirty="0"/>
           </a:p>
         </p:txBody>
       </p:sp>
@@ -7430,7 +7390,6 @@
               <a:rPr lang="ru-RU" dirty="0"/>
               <a:t> — описывает реальное расположение и связи между узлами сети.</a:t>
             </a:r>
-            <a:endParaRPr lang="ru-RU" dirty="0"/>
           </a:p>
           <a:p>
             <a:r>
@@ -7445,7 +7404,6 @@
               <a:rPr lang="ru-RU" dirty="0"/>
               <a:t>— описывает хождение сигнала в рамках физической топологии.</a:t>
             </a:r>
-            <a:endParaRPr lang="ru-RU" dirty="0"/>
           </a:p>
           <a:p>
             <a:r>
@@ -7456,7 +7414,6 @@
               <a:rPr lang="ru-RU" dirty="0"/>
               <a:t> — описывает направление потоков информации, передаваемых по сети.</a:t>
             </a:r>
-            <a:endParaRPr lang="ru-RU" dirty="0"/>
           </a:p>
           <a:p>
             <a:r>
@@ -7467,7 +7424,6 @@
               <a:rPr lang="ru-RU" dirty="0"/>
               <a:t> — это принцип передачи права на пользование сетью.</a:t>
             </a:r>
-            <a:endParaRPr lang="ru-RU" dirty="0"/>
           </a:p>
           <a:p>
             <a:endParaRPr lang="ru-RU" dirty="0"/>
@@ -7562,7 +7518,6 @@
               <a:rPr lang="ru-RU" dirty="0"/>
               <a:t>компьютер связан со всеми остальными. Громоздкий и неэффективный вариант, т.к. каждый компьютер должен иметь большое кол-во коммуникационных портов.</a:t>
             </a:r>
-            <a:endParaRPr lang="ru-RU" dirty="0"/>
           </a:p>
         </p:txBody>
       </p:sp>
@@ -7570,14 +7525,14 @@
         <p:nvPicPr>
           <p:cNvPr id="4" name="Замещающее содержимое 3"/>
           <p:cNvPicPr>
-            <a:picLocks noChangeAspect="1"/>
+            <a:picLocks noGrp="1" noChangeAspect="1"/>
           </p:cNvPicPr>
           <p:nvPr>
             <p:ph sz="quarter" idx="2"/>
           </p:nvPr>
         </p:nvPicPr>
         <p:blipFill>
-          <a:blip r:embed="rId1"/>
+          <a:blip r:embed="rId2"/>
           <a:stretch>
             <a:fillRect/>
           </a:stretch>
@@ -7693,7 +7648,6 @@
               <a:rPr lang="ru-RU" dirty="0"/>
               <a:t>этот вид топологии используется в многомашинных комплексах или в сетях, объединяющих небольшое количество компьютеров.</a:t>
             </a:r>
-            <a:endParaRPr lang="ru-RU" dirty="0"/>
           </a:p>
         </p:txBody>
       </p:sp>
@@ -7778,21 +7732,21 @@
               <a:rPr lang="ru-RU" sz="2400" dirty="0"/>
               <a:t>Компьютеры подключаются к одному коаксиальному кабелю. Данные от передающего узла сети передаются по шине в обе стороны, отражаясь от оконечных терминаторов.</a:t>
             </a:r>
-            <a:endParaRPr lang="ru-RU" sz="2400" dirty="0"/>
           </a:p>
           <a:p>
             <a:r>
               <a:rPr lang="ru-RU" sz="2400" dirty="0"/>
               <a:t> Терминаторы предотвращают отражение сигналов, т.е. используются для гашения сигналов, которые достигают концов канала передачи данных.</a:t>
             </a:r>
-            <a:endParaRPr lang="ru-RU" sz="2400" dirty="0"/>
           </a:p>
         </p:txBody>
       </p:sp>
       <p:graphicFrame>
         <p:nvGraphicFramePr>
           <p:cNvPr id="4" name="Замещающее содержимое 3"/>
-          <p:cNvGraphicFramePr/>
+          <p:cNvGraphicFramePr>
+            <a:graphicFrameLocks noGrp="1"/>
+          </p:cNvGraphicFramePr>
           <p:nvPr>
             <p:ph sz="quarter" idx="2"/>
           </p:nvPr>
@@ -7805,12 +7759,12 @@
           <a:graphicData uri="http://schemas.openxmlformats.org/presentationml/2006/ole">
             <mc:AlternateContent xmlns:mc="http://schemas.openxmlformats.org/markup-compatibility/2006">
               <mc:Choice xmlns:v="urn:schemas-microsoft-com:vml" Requires="v">
-                <p:oleObj spid="_x0000_s5" name="" r:id="rId1" imgW="3857625" imgH="3495675" progId="Visio.Drawing.11">
+                <p:oleObj spid="_x0000_s1027" r:id="rId3" imgW="3857625" imgH="3495675" progId="Visio.Drawing.11">
                   <p:embed/>
                 </p:oleObj>
               </mc:Choice>
               <mc:Fallback>
-                <p:oleObj name="" r:id="rId1" imgW="3857625" imgH="3495675" progId="Visio.Drawing.11">
+                <p:oleObj r:id="rId3" imgW="3857625" imgH="3495675" progId="Visio.Drawing.11">
                   <p:embed/>
                   <p:pic>
                     <p:nvPicPr>
@@ -7819,7 +7773,7 @@
                       <p:nvPr/>
                     </p:nvPicPr>
                     <p:blipFill>
-                      <a:blip r:embed="rId2"/>
+                      <a:blip r:embed="rId4"/>
                       <a:stretch>
                         <a:fillRect/>
                       </a:stretch>
@@ -7933,28 +7887,24 @@
               <a:rPr lang="ru-RU" dirty="0"/>
               <a:t>:</a:t>
             </a:r>
-            <a:endParaRPr lang="ru-RU" dirty="0"/>
           </a:p>
           <a:p>
             <a:r>
               <a:rPr lang="ru-RU" dirty="0"/>
               <a:t>отказ одного из узлов не влияет на работу сети в целом;</a:t>
             </a:r>
-            <a:endParaRPr lang="ru-RU" dirty="0"/>
           </a:p>
           <a:p>
             <a:r>
               <a:rPr lang="ru-RU" dirty="0"/>
               <a:t>сеть легко настраивать и конфигурировать;</a:t>
             </a:r>
-            <a:endParaRPr lang="ru-RU" dirty="0"/>
           </a:p>
           <a:p>
             <a:r>
               <a:rPr lang="ru-RU" dirty="0"/>
               <a:t>сеть устойчива к неисправностям отдельных узлов.</a:t>
             </a:r>
-            <a:endParaRPr lang="ru-RU" dirty="0"/>
           </a:p>
           <a:p>
             <a:pPr marL="0" indent="0">
@@ -7968,28 +7918,24 @@
               <a:rPr lang="ru-RU" dirty="0"/>
               <a:t>:</a:t>
             </a:r>
-            <a:endParaRPr lang="ru-RU" dirty="0"/>
           </a:p>
           <a:p>
             <a:r>
               <a:rPr lang="ru-RU" dirty="0"/>
               <a:t>разрыв кабеля может повлиять на работу всей сети;</a:t>
             </a:r>
-            <a:endParaRPr lang="ru-RU" dirty="0"/>
           </a:p>
           <a:p>
             <a:r>
               <a:rPr lang="ru-RU" dirty="0"/>
               <a:t>ограниченная длина кабеля и количество рабочих станций;</a:t>
             </a:r>
-            <a:endParaRPr lang="ru-RU" dirty="0"/>
           </a:p>
           <a:p>
             <a:r>
               <a:rPr lang="ru-RU" dirty="0"/>
               <a:t>трудно определить дефекты соединений.</a:t>
             </a:r>
-            <a:endParaRPr lang="ru-RU" dirty="0"/>
           </a:p>
           <a:p>
             <a:endParaRPr lang="ru-RU" dirty="0"/>
@@ -8091,7 +8037,6 @@
               <a:rPr lang="ru-RU" dirty="0"/>
               <a:t> путем удаления некоторых связей. Непосредственно связываются только те компьютеры,  между которыми происходит интенсивный обмен данными. Даная топология характерна для глобальных сетей</a:t>
             </a:r>
-            <a:endParaRPr lang="ru-RU" dirty="0"/>
           </a:p>
         </p:txBody>
       </p:sp>
@@ -8200,7 +8145,6 @@
               <a:rPr lang="ru-RU" dirty="0"/>
               <a:t>компьютер имеет множество возможных путей соединения с другими компьютерами. Обрыв кабеля не приведёт к потере соединения между двумя компьютерами.</a:t>
             </a:r>
-            <a:endParaRPr lang="ru-RU" dirty="0"/>
           </a:p>
         </p:txBody>
       </p:sp>
@@ -8293,21 +8237,21 @@
               <a:rPr lang="ru-RU" sz="2400" dirty="0"/>
               <a:t> </a:t>
             </a:r>
-            <a:endParaRPr lang="ru-RU" sz="2400" dirty="0"/>
           </a:p>
           <a:p>
             <a:r>
               <a:rPr lang="ru-RU" sz="2400" dirty="0"/>
               <a:t>Данные в кольце всегда движутся в одном и том же направлении.</a:t>
             </a:r>
-            <a:endParaRPr lang="ru-RU" sz="2400" dirty="0"/>
           </a:p>
         </p:txBody>
       </p:sp>
       <p:graphicFrame>
         <p:nvGraphicFramePr>
           <p:cNvPr id="4" name="Замещающее содержимое 3"/>
-          <p:cNvGraphicFramePr/>
+          <p:cNvGraphicFramePr>
+            <a:graphicFrameLocks noGrp="1"/>
+          </p:cNvGraphicFramePr>
           <p:nvPr>
             <p:ph sz="quarter" idx="2"/>
           </p:nvPr>
@@ -8320,12 +8264,12 @@
           <a:graphicData uri="http://schemas.openxmlformats.org/presentationml/2006/ole">
             <mc:AlternateContent xmlns:mc="http://schemas.openxmlformats.org/markup-compatibility/2006">
               <mc:Choice xmlns:v="urn:schemas-microsoft-com:vml" Requires="v">
-                <p:oleObj spid="_x0000_s5" name="" r:id="rId1" imgW="4848225" imgH="4572000" progId="Visio.Drawing.11">
+                <p:oleObj spid="_x0000_s2051" r:id="rId3" imgW="4848225" imgH="4572000" progId="Visio.Drawing.11">
                   <p:embed/>
                 </p:oleObj>
               </mc:Choice>
               <mc:Fallback>
-                <p:oleObj name="" r:id="rId1" imgW="4848225" imgH="4572000" progId="Visio.Drawing.11">
+                <p:oleObj r:id="rId3" imgW="4848225" imgH="4572000" progId="Visio.Drawing.11">
                   <p:embed/>
                   <p:pic>
                     <p:nvPicPr>
@@ -8334,7 +8278,7 @@
                       <p:nvPr/>
                     </p:nvPicPr>
                     <p:blipFill>
-                      <a:blip r:embed="rId2"/>
+                      <a:blip r:embed="rId4"/>
                       <a:stretch>
                         <a:fillRect/>
                       </a:stretch>
@@ -8453,7 +8397,6 @@
               <a:rPr lang="ru-RU" dirty="0" smtClean="0"/>
               <a:t>кольца</a:t>
             </a:r>
-            <a:endParaRPr lang="ru-RU" dirty="0" smtClean="0"/>
           </a:p>
           <a:p>
             <a:r>
@@ -8573,21 +8516,18 @@
               <a:rPr lang="ru-RU" dirty="0"/>
               <a:t>Простота установки;</a:t>
             </a:r>
-            <a:endParaRPr lang="ru-RU" dirty="0"/>
           </a:p>
           <a:p>
             <a:r>
               <a:rPr lang="ru-RU" dirty="0"/>
               <a:t>Практически полное отсутствие дополнительного оборудования;</a:t>
             </a:r>
-            <a:endParaRPr lang="ru-RU" dirty="0"/>
           </a:p>
           <a:p>
             <a:r>
               <a:rPr lang="ru-RU" dirty="0"/>
               <a:t>Возможность устойчивой работы без существенного падения скорости передачи данных при интенсивной загрузке сети, поскольку использование маркера исключает возможность возникновения коллизий.</a:t>
             </a:r>
-            <a:endParaRPr lang="ru-RU" dirty="0"/>
           </a:p>
           <a:p>
             <a:pPr marL="0" indent="0">
@@ -8608,28 +8548,24 @@
               <a:rPr lang="ru-RU" dirty="0"/>
               <a:t>Выход из строя одной рабочей станции, и другие неполадки (обрыв кабеля), отражаются на работоспособности всей сети;</a:t>
             </a:r>
-            <a:endParaRPr lang="ru-RU" dirty="0"/>
           </a:p>
           <a:p>
             <a:r>
               <a:rPr lang="ru-RU" dirty="0"/>
               <a:t>Сложность конфигурирования и настройки;</a:t>
             </a:r>
-            <a:endParaRPr lang="ru-RU" dirty="0"/>
           </a:p>
           <a:p>
             <a:r>
               <a:rPr lang="ru-RU" dirty="0"/>
               <a:t>Сложность поиска неисправностей.</a:t>
             </a:r>
-            <a:endParaRPr lang="ru-RU" dirty="0"/>
           </a:p>
           <a:p>
             <a:r>
               <a:rPr lang="ru-RU" dirty="0"/>
               <a:t>Необходимость иметь две сетевые платы, на каждой рабочей станции.</a:t>
             </a:r>
-            <a:endParaRPr lang="ru-RU" dirty="0"/>
           </a:p>
           <a:p>
             <a:endParaRPr lang="ru-RU" dirty="0"/>
@@ -8740,10 +8676,6 @@
               </a:rPr>
               <a:t>и обзор сетей</a:t>
             </a:r>
-            <a:endParaRPr lang="ru-RU" sz="2400" dirty="0">
-              <a:latin typeface="+mn-ea"/>
-              <a:cs typeface="+mn-ea"/>
-            </a:endParaRPr>
           </a:p>
         </p:txBody>
       </p:sp>
@@ -8865,7 +8797,6 @@
               <a:rPr lang="ru-RU" dirty="0" smtClean="0"/>
               <a:t>).</a:t>
             </a:r>
-            <a:endParaRPr lang="ru-RU" dirty="0" smtClean="0"/>
           </a:p>
           <a:p>
             <a:r>
@@ -8888,7 +8819,6 @@
               <a:rPr lang="ru-RU" dirty="0"/>
               <a:t>практике применяются различные ее модификации</a:t>
             </a:r>
-            <a:endParaRPr lang="ru-RU" dirty="0"/>
           </a:p>
           <a:p>
             <a:endParaRPr lang="ru-RU" dirty="0"/>
@@ -8986,7 +8916,6 @@
               <a:rPr lang="ru-RU" dirty="0" smtClean="0"/>
               <a:t>концентратору или коммутатору. </a:t>
             </a:r>
-            <a:endParaRPr lang="ru-RU" dirty="0" smtClean="0"/>
           </a:p>
           <a:p>
             <a:r>
@@ -9008,7 +8937,9 @@
       <p:graphicFrame>
         <p:nvGraphicFramePr>
           <p:cNvPr id="4" name="Замещающее содержимое 3"/>
-          <p:cNvGraphicFramePr/>
+          <p:cNvGraphicFramePr>
+            <a:graphicFrameLocks noGrp="1"/>
+          </p:cNvGraphicFramePr>
           <p:nvPr>
             <p:ph sz="quarter" idx="2"/>
           </p:nvPr>
@@ -9021,12 +8952,12 @@
           <a:graphicData uri="http://schemas.openxmlformats.org/presentationml/2006/ole">
             <mc:AlternateContent xmlns:mc="http://schemas.openxmlformats.org/markup-compatibility/2006">
               <mc:Choice xmlns:v="urn:schemas-microsoft-com:vml" Requires="v">
-                <p:oleObj spid="_x0000_s5" name="" r:id="rId1" imgW="4038600" imgH="3324225" progId="Visio.Drawing.11">
+                <p:oleObj spid="_x0000_s3075" r:id="rId3" imgW="4038600" imgH="3324225" progId="Visio.Drawing.11">
                   <p:embed/>
                 </p:oleObj>
               </mc:Choice>
               <mc:Fallback>
-                <p:oleObj name="" r:id="rId1" imgW="4038600" imgH="3324225" progId="Visio.Drawing.11">
+                <p:oleObj r:id="rId3" imgW="4038600" imgH="3324225" progId="Visio.Drawing.11">
                   <p:embed/>
                   <p:pic>
                     <p:nvPicPr>
@@ -9035,7 +8966,7 @@
                       <p:nvPr/>
                     </p:nvPicPr>
                     <p:blipFill>
-                      <a:blip r:embed="rId2"/>
+                      <a:blip r:embed="rId4"/>
                       <a:stretch>
                         <a:fillRect/>
                       </a:stretch>
@@ -9158,35 +9089,30 @@
               <a:rPr lang="ru-RU" dirty="0"/>
               <a:t>выход из строя одной рабочей станции не отражается на работе всей сети в целом;</a:t>
             </a:r>
-            <a:endParaRPr lang="ru-RU" dirty="0"/>
           </a:p>
           <a:p>
             <a:r>
               <a:rPr lang="ru-RU" dirty="0"/>
               <a:t>хорошая масштабируемость сети;</a:t>
             </a:r>
-            <a:endParaRPr lang="ru-RU" dirty="0"/>
           </a:p>
           <a:p>
             <a:r>
               <a:rPr lang="ru-RU" dirty="0"/>
               <a:t>лёгкий поиск неисправностей и обрывов в сети;</a:t>
             </a:r>
-            <a:endParaRPr lang="ru-RU" dirty="0"/>
           </a:p>
           <a:p>
             <a:r>
               <a:rPr lang="ru-RU" dirty="0"/>
               <a:t>высокая производительность сети (при условии правильного проектирования);</a:t>
             </a:r>
-            <a:endParaRPr lang="ru-RU" dirty="0"/>
           </a:p>
           <a:p>
             <a:r>
               <a:rPr lang="ru-RU" dirty="0"/>
               <a:t>гибкие возможности администрирования.</a:t>
             </a:r>
-            <a:endParaRPr lang="ru-RU" dirty="0"/>
           </a:p>
           <a:p>
             <a:pPr marL="0" indent="0">
@@ -9207,21 +9133,18 @@
               <a:rPr lang="ru-RU" dirty="0"/>
               <a:t>выход из строя центрального концентратора обернётся неработоспособностью сети (или сегмента сети) в целом;</a:t>
             </a:r>
-            <a:endParaRPr lang="ru-RU" dirty="0"/>
           </a:p>
           <a:p>
             <a:r>
               <a:rPr lang="ru-RU" dirty="0"/>
               <a:t>для прокладки сети зачастую требуется больше кабеля, чем для большинства других топологий;</a:t>
             </a:r>
-            <a:endParaRPr lang="ru-RU" dirty="0"/>
           </a:p>
           <a:p>
             <a:r>
               <a:rPr lang="ru-RU" dirty="0"/>
               <a:t>конечное число рабочих станций в сети (или сегменте сети) ограничено количеством портов в центральном концентраторе.</a:t>
             </a:r>
-            <a:endParaRPr lang="ru-RU" dirty="0"/>
           </a:p>
         </p:txBody>
       </p:sp>
@@ -9360,14 +9283,12 @@
               <a:rPr lang="ru-RU" dirty="0"/>
               <a:t>иерархически соединенных между собой связями типа звезда. </a:t>
             </a:r>
-            <a:endParaRPr lang="ru-RU" dirty="0"/>
           </a:p>
           <a:p>
             <a:r>
               <a:rPr lang="ru-RU" dirty="0"/>
               <a:t>Самый распространенный способ связей как в локальных сетях, так и в глобальных.</a:t>
             </a:r>
-            <a:endParaRPr lang="ru-RU" dirty="0"/>
           </a:p>
         </p:txBody>
       </p:sp>
@@ -9380,7 +9301,7 @@
           <p:nvPr/>
         </p:nvPicPr>
         <p:blipFill>
-          <a:blip r:embed="rId1">
+          <a:blip r:embed="rId2">
             <a:extLst>
               <a:ext uri="{28A0092B-C50C-407E-A947-70E740481C1C}">
                 <a14:useLocalDpi xmlns:a14="http://schemas.microsoft.com/office/drawing/2010/main" val="0"/>
@@ -9524,7 +9445,6 @@
               <a:rPr lang="ru-RU" dirty="0"/>
               <a:t>образом, пользователь получает возможность гибко комбинировать преимущества шинной и звездной топологий, а также легко изменять количество компьютеров, подключенных к сети.</a:t>
             </a:r>
-            <a:endParaRPr lang="ru-RU" dirty="0"/>
           </a:p>
         </p:txBody>
       </p:sp>
@@ -9579,7 +9499,6 @@
               <a:rPr lang="ru-RU" dirty="0"/>
               <a:t>Гибридная топология</a:t>
             </a:r>
-            <a:endParaRPr lang="ru-RU" dirty="0"/>
           </a:p>
         </p:txBody>
       </p:sp>
@@ -9621,7 +9540,6 @@
               <a:rPr lang="ru-RU" dirty="0"/>
               <a:t>действительности все компьютеры сети включаются в замкнутое кольцо, так как внутри концентраторов все линии связи образуют замкнутый контур. Данная топология позволяет комбинировать преимущества звездной и кольцевой топологий.</a:t>
             </a:r>
-            <a:endParaRPr lang="ru-RU" dirty="0"/>
           </a:p>
         </p:txBody>
       </p:sp>
@@ -9700,7 +9618,6 @@
               <a:rPr lang="ru-RU" dirty="0"/>
               <a:t>компьютеров и других устройств, соединенных линиями связи и обменивающихся информацией между собой в соответствии с определенными правилами – протоколом.</a:t>
             </a:r>
-            <a:endParaRPr lang="ru-RU" dirty="0"/>
           </a:p>
         </p:txBody>
       </p:sp>
@@ -9713,7 +9630,7 @@
           <p:nvPr/>
         </p:nvPicPr>
         <p:blipFill>
-          <a:blip r:embed="rId1">
+          <a:blip r:embed="rId2">
             <a:extLst>
               <a:ext uri="{28A0092B-C50C-407E-A947-70E740481C1C}">
                 <a14:useLocalDpi xmlns:a14="http://schemas.microsoft.com/office/drawing/2010/main" val="0"/>
@@ -9910,22 +9827,21 @@
               <a:rPr lang="ru-RU" dirty="0" smtClean="0"/>
               <a:t>Предоставление конечным узлам возможности совместного использования ресурсов</a:t>
             </a:r>
+          </a:p>
+          <a:p>
+            <a:r>
+              <a:rPr lang="ru-RU" dirty="0" smtClean="0"/>
+              <a:t>Ресурсы </a:t>
+            </a:r>
+            <a:r>
+              <a:rPr lang="ru-RU" dirty="0"/>
+              <a:t>бывают трех типов: аппаратные, программные и информационные. </a:t>
+            </a:r>
             <a:endParaRPr lang="ru-RU" dirty="0" smtClean="0"/>
           </a:p>
           <a:p>
             <a:r>
               <a:rPr lang="ru-RU" dirty="0" smtClean="0"/>
-              <a:t>Ресурсы </a:t>
-            </a:r>
-            <a:r>
-              <a:rPr lang="ru-RU" dirty="0"/>
-              <a:t>бывают трех типов: аппаратные, программные и информационные. </a:t>
-            </a:r>
-            <a:endParaRPr lang="ru-RU" dirty="0" smtClean="0"/>
-          </a:p>
-          <a:p>
-            <a:r>
-              <a:rPr lang="ru-RU" dirty="0" smtClean="0"/>
               <a:t>Например</a:t>
             </a:r>
             <a:r>
@@ -9948,7 +9864,6 @@
               <a:rPr lang="ru-RU" dirty="0"/>
               <a:t>тоже аппаратный ресурс. Когда все участники небольшой компьютерной сети пользуются одним общим принтером, это значит, что они разделяют общий аппаратный ресурс. То же можно сказать и о сети, имеющей один компьютер с увеличенной емкостью жесткого диска (файловый сервер), на котором все участники сети хранят свои архивы и результаты работы.</a:t>
             </a:r>
-            <a:endParaRPr lang="ru-RU" dirty="0"/>
           </a:p>
         </p:txBody>
       </p:sp>
@@ -10003,7 +9918,6 @@
               <a:rPr lang="ru-RU" dirty="0"/>
               <a:t>Назначение сети</a:t>
             </a:r>
-            <a:endParaRPr lang="ru-RU" dirty="0"/>
           </a:p>
         </p:txBody>
       </p:sp>
@@ -10028,14 +9942,12 @@
               <a:rPr lang="ru-RU" dirty="0"/>
               <a:t>Кроме аппаратных ресурсов компьютерные сети позволяют совместно использовать программные ресурсы. Так, например, для выполнения очень сложных и продолжительных расчетов можно подключиться к удаленной большой ЭВМ и отправить вычислительное задание на нее, а по окончании расчетов точно так же получить результат обратно.</a:t>
             </a:r>
-            <a:endParaRPr lang="ru-RU" dirty="0"/>
           </a:p>
           <a:p>
             <a:r>
               <a:rPr lang="ru-RU" dirty="0"/>
               <a:t>Данные, хранящиеся на удаленных компьютерах, образуют информационный ресурс. Роль этого ресурса сегодня видна наиболее ярко на примере Интернета, который воспринимается, прежде всего, как гигантская информационно-справочная система.</a:t>
             </a:r>
-            <a:endParaRPr lang="ru-RU" dirty="0"/>
           </a:p>
           <a:p>
             <a:r>
@@ -10046,7 +9958,6 @@
               <a:rPr lang="ru-RU" dirty="0"/>
               <a:t>в компьютерной сети любого типа одновременно происходит совместное использование всех типов ресурсов. </a:t>
             </a:r>
-            <a:endParaRPr lang="ru-RU" dirty="0"/>
           </a:p>
         </p:txBody>
       </p:sp>
@@ -10168,7 +10079,6 @@
               <a:rPr lang="ru-RU" dirty="0"/>
               <a:t>набор правил и действий (очерёдности действий), позволяющий осуществлять соединение и обмен данными между двумя и более включёнными в сеть устройствами.</a:t>
             </a:r>
-            <a:endParaRPr lang="ru-RU" dirty="0"/>
           </a:p>
         </p:txBody>
       </p:sp>
@@ -10278,7 +10188,6 @@
               <a:rPr lang="ru-RU" dirty="0" smtClean="0"/>
               <a:t>проходящая по определенным правилам</a:t>
             </a:r>
-            <a:endParaRPr lang="ru-RU" dirty="0" smtClean="0"/>
           </a:p>
           <a:p>
             <a:endParaRPr lang="ru-RU" dirty="0"/>
@@ -10294,7 +10203,7 @@
           <p:nvPr/>
         </p:nvPicPr>
         <p:blipFill>
-          <a:blip r:embed="rId1">
+          <a:blip r:embed="rId2">
             <a:extLst>
               <a:ext uri="{28A0092B-C50C-407E-A947-70E740481C1C}">
                 <a14:useLocalDpi xmlns:a14="http://schemas.microsoft.com/office/drawing/2010/main" val="0"/>
@@ -10683,6 +10592,8 @@
       </a:bgFillStyleLst>
     </a:fmtScheme>
   </a:themeElements>
+  <a:objectDefaults/>
+  <a:extraClrSchemeLst/>
   <a:extLst>
     <a:ext uri="{05A4C25C-085E-4340-85A3-A5531E510DB2}">
       <thm15:themeFamily xmlns:thm15="http://schemas.microsoft.com/office/thememl/2012/main" name="Office Theme" id="{62F939B6-93AF-4DB8-9C6B-D6C7DFDC589F}" vid="{4A3C46E8-61CC-4603-A589-7422A47A8E4A}"/>

</xml_diff>